<commit_message>
change directory name tex to thesis
</commit_message>
<xml_diff>
--- a/illustration/illusts.pptx
+++ b/illustration/illusts.pptx
@@ -5,7 +5,7 @@
     <p:sldMasterId id="2147483648" r:id="rId1"/>
   </p:sldMasterIdLst>
   <p:notesMasterIdLst>
-    <p:notesMasterId r:id="rId15"/>
+    <p:notesMasterId r:id="rId17"/>
   </p:notesMasterIdLst>
   <p:sldIdLst>
     <p:sldId id="266" r:id="rId2"/>
@@ -21,6 +21,8 @@
     <p:sldId id="262" r:id="rId12"/>
     <p:sldId id="265" r:id="rId13"/>
     <p:sldId id="263" r:id="rId14"/>
+    <p:sldId id="272" r:id="rId15"/>
+    <p:sldId id="273" r:id="rId16"/>
   </p:sldIdLst>
   <p:sldSz cx="12192000" cy="6858000"/>
   <p:notesSz cx="6858000" cy="9144000"/>
@@ -209,7 +211,7 @@
           <a:p>
             <a:fld id="{3B91CE91-3241-4040-AF54-7BF47CA66737}" type="datetimeFigureOut">
               <a:rPr kumimoji="1" lang="ja-JP" altLang="en-US" smtClean="0"/>
-              <a:t>2020/12/23</a:t>
+              <a:t>2020/12/31</a:t>
             </a:fld>
             <a:endParaRPr kumimoji="1" lang="ja-JP" altLang="en-US"/>
           </a:p>
@@ -1084,7 +1086,7 @@
           <a:p>
             <a:fld id="{C245CA38-B217-504E-A0D9-BA25E637AC92}" type="datetimeFigureOut">
               <a:rPr kumimoji="1" lang="ja-JP" altLang="en-US" smtClean="0"/>
-              <a:t>2020/12/23</a:t>
+              <a:t>2020/12/31</a:t>
             </a:fld>
             <a:endParaRPr kumimoji="1" lang="ja-JP" altLang="en-US"/>
           </a:p>
@@ -1314,7 +1316,7 @@
           <a:p>
             <a:fld id="{C245CA38-B217-504E-A0D9-BA25E637AC92}" type="datetimeFigureOut">
               <a:rPr kumimoji="1" lang="ja-JP" altLang="en-US" smtClean="0"/>
-              <a:t>2020/12/23</a:t>
+              <a:t>2020/12/31</a:t>
             </a:fld>
             <a:endParaRPr kumimoji="1" lang="ja-JP" altLang="en-US"/>
           </a:p>
@@ -1554,7 +1556,7 @@
           <a:p>
             <a:fld id="{C245CA38-B217-504E-A0D9-BA25E637AC92}" type="datetimeFigureOut">
               <a:rPr kumimoji="1" lang="ja-JP" altLang="en-US" smtClean="0"/>
-              <a:t>2020/12/23</a:t>
+              <a:t>2020/12/31</a:t>
             </a:fld>
             <a:endParaRPr kumimoji="1" lang="ja-JP" altLang="en-US"/>
           </a:p>
@@ -1784,7 +1786,7 @@
           <a:p>
             <a:fld id="{C245CA38-B217-504E-A0D9-BA25E637AC92}" type="datetimeFigureOut">
               <a:rPr kumimoji="1" lang="ja-JP" altLang="en-US" smtClean="0"/>
-              <a:t>2020/12/23</a:t>
+              <a:t>2020/12/31</a:t>
             </a:fld>
             <a:endParaRPr kumimoji="1" lang="ja-JP" altLang="en-US"/>
           </a:p>
@@ -2059,7 +2061,7 @@
           <a:p>
             <a:fld id="{C245CA38-B217-504E-A0D9-BA25E637AC92}" type="datetimeFigureOut">
               <a:rPr kumimoji="1" lang="ja-JP" altLang="en-US" smtClean="0"/>
-              <a:t>2020/12/23</a:t>
+              <a:t>2020/12/31</a:t>
             </a:fld>
             <a:endParaRPr kumimoji="1" lang="ja-JP" altLang="en-US"/>
           </a:p>
@@ -2388,7 +2390,7 @@
           <a:p>
             <a:fld id="{C245CA38-B217-504E-A0D9-BA25E637AC92}" type="datetimeFigureOut">
               <a:rPr kumimoji="1" lang="ja-JP" altLang="en-US" smtClean="0"/>
-              <a:t>2020/12/23</a:t>
+              <a:t>2020/12/31</a:t>
             </a:fld>
             <a:endParaRPr kumimoji="1" lang="ja-JP" altLang="en-US"/>
           </a:p>
@@ -2864,7 +2866,7 @@
           <a:p>
             <a:fld id="{C245CA38-B217-504E-A0D9-BA25E637AC92}" type="datetimeFigureOut">
               <a:rPr kumimoji="1" lang="ja-JP" altLang="en-US" smtClean="0"/>
-              <a:t>2020/12/23</a:t>
+              <a:t>2020/12/31</a:t>
             </a:fld>
             <a:endParaRPr kumimoji="1" lang="ja-JP" altLang="en-US"/>
           </a:p>
@@ -3005,7 +3007,7 @@
           <a:p>
             <a:fld id="{C245CA38-B217-504E-A0D9-BA25E637AC92}" type="datetimeFigureOut">
               <a:rPr kumimoji="1" lang="ja-JP" altLang="en-US" smtClean="0"/>
-              <a:t>2020/12/23</a:t>
+              <a:t>2020/12/31</a:t>
             </a:fld>
             <a:endParaRPr kumimoji="1" lang="ja-JP" altLang="en-US"/>
           </a:p>
@@ -3118,7 +3120,7 @@
           <a:p>
             <a:fld id="{C245CA38-B217-504E-A0D9-BA25E637AC92}" type="datetimeFigureOut">
               <a:rPr kumimoji="1" lang="ja-JP" altLang="en-US" smtClean="0"/>
-              <a:t>2020/12/23</a:t>
+              <a:t>2020/12/31</a:t>
             </a:fld>
             <a:endParaRPr kumimoji="1" lang="ja-JP" altLang="en-US"/>
           </a:p>
@@ -3461,7 +3463,7 @@
           <a:p>
             <a:fld id="{C245CA38-B217-504E-A0D9-BA25E637AC92}" type="datetimeFigureOut">
               <a:rPr kumimoji="1" lang="ja-JP" altLang="en-US" smtClean="0"/>
-              <a:t>2020/12/23</a:t>
+              <a:t>2020/12/31</a:t>
             </a:fld>
             <a:endParaRPr kumimoji="1" lang="ja-JP" altLang="en-US"/>
           </a:p>
@@ -3749,7 +3751,7 @@
           <a:p>
             <a:fld id="{C245CA38-B217-504E-A0D9-BA25E637AC92}" type="datetimeFigureOut">
               <a:rPr kumimoji="1" lang="ja-JP" altLang="en-US" smtClean="0"/>
-              <a:t>2020/12/23</a:t>
+              <a:t>2020/12/31</a:t>
             </a:fld>
             <a:endParaRPr kumimoji="1" lang="ja-JP" altLang="en-US"/>
           </a:p>
@@ -4022,7 +4024,7 @@
           <a:p>
             <a:fld id="{C245CA38-B217-504E-A0D9-BA25E637AC92}" type="datetimeFigureOut">
               <a:rPr kumimoji="1" lang="ja-JP" altLang="en-US" smtClean="0"/>
-              <a:t>2020/12/23</a:t>
+              <a:t>2020/12/31</a:t>
             </a:fld>
             <a:endParaRPr kumimoji="1" lang="ja-JP" altLang="en-US"/>
           </a:p>
@@ -16443,8 +16445,8 @@
         </p:nvSpPr>
         <p:spPr>
           <a:xfrm>
-            <a:off x="5504751" y="1324262"/>
-            <a:ext cx="1048684" cy="369332"/>
+            <a:off x="5600931" y="1324262"/>
+            <a:ext cx="856324" cy="369332"/>
           </a:xfrm>
           <a:prstGeom prst="rect">
             <a:avLst/>
@@ -16463,7 +16465,7 @@
                 <a:latin typeface="Arial" panose="020B0604020202020204" pitchFamily="34" charset="0"/>
                 <a:cs typeface="Arial" panose="020B0604020202020204" pitchFamily="34" charset="0"/>
               </a:rPr>
-              <a:t>3×Φ1.5</a:t>
+              <a:t>3×Φ3</a:t>
             </a:r>
             <a:endParaRPr kumimoji="1" lang="ja-JP" altLang="en-US">
               <a:latin typeface="Arial" panose="020B0604020202020204" pitchFamily="34" charset="0"/>
@@ -16486,8 +16488,8 @@
         </p:nvSpPr>
         <p:spPr>
           <a:xfrm>
-            <a:off x="8000132" y="2818508"/>
-            <a:ext cx="817853" cy="369332"/>
+            <a:off x="8096312" y="2818508"/>
+            <a:ext cx="625492" cy="369332"/>
           </a:xfrm>
           <a:prstGeom prst="rect">
             <a:avLst/>
@@ -16506,7 +16508,7 @@
                 <a:latin typeface="Arial" panose="020B0604020202020204" pitchFamily="34" charset="0"/>
                 <a:cs typeface="Arial" panose="020B0604020202020204" pitchFamily="34" charset="0"/>
               </a:rPr>
-              <a:t>Φ25.0</a:t>
+              <a:t>Φ25</a:t>
             </a:r>
             <a:endParaRPr kumimoji="1" lang="ja-JP" altLang="en-US">
               <a:latin typeface="Arial" panose="020B0604020202020204" pitchFamily="34" charset="0"/>
@@ -16576,7 +16578,7 @@
         <p:spPr>
           <a:xfrm>
             <a:off x="7831459" y="3003174"/>
-            <a:ext cx="168673" cy="0"/>
+            <a:ext cx="264853" cy="0"/>
           </a:xfrm>
           <a:prstGeom prst="line">
             <a:avLst/>
@@ -16711,6 +16713,838 @@
     <p:extLst>
       <p:ext uri="{BB962C8B-B14F-4D97-AF65-F5344CB8AC3E}">
         <p14:creationId xmlns:p14="http://schemas.microsoft.com/office/powerpoint/2010/main" val="3465888439"/>
+      </p:ext>
+    </p:extLst>
+  </p:cSld>
+  <p:clrMapOvr>
+    <a:masterClrMapping/>
+  </p:clrMapOvr>
+</p:sld>
+</file>
+
+<file path=ppt/slides/slide14.xml><?xml version="1.0" encoding="utf-8"?>
+<p:sld xmlns:a="http://schemas.openxmlformats.org/drawingml/2006/main" xmlns:r="http://schemas.openxmlformats.org/officeDocument/2006/relationships" xmlns:p="http://schemas.openxmlformats.org/presentationml/2006/main">
+  <p:cSld>
+    <p:spTree>
+      <p:nvGrpSpPr>
+        <p:cNvPr id="1" name=""/>
+        <p:cNvGrpSpPr/>
+        <p:nvPr/>
+      </p:nvGrpSpPr>
+      <p:grpSpPr>
+        <a:xfrm>
+          <a:off x="0" y="0"/>
+          <a:ext cx="0" cy="0"/>
+          <a:chOff x="0" y="0"/>
+          <a:chExt cx="0" cy="0"/>
+        </a:xfrm>
+      </p:grpSpPr>
+      <p:sp>
+        <p:nvSpPr>
+          <p:cNvPr id="7" name="円/楕円 6">
+            <a:extLst>
+              <a:ext uri="{FF2B5EF4-FFF2-40B4-BE49-F238E27FC236}">
+                <a16:creationId xmlns:a16="http://schemas.microsoft.com/office/drawing/2014/main" id="{75034056-632A-E64C-B4A8-5F67F212A1F4}"/>
+              </a:ext>
+            </a:extLst>
+          </p:cNvPr>
+          <p:cNvSpPr/>
+          <p:nvPr/>
+        </p:nvSpPr>
+        <p:spPr>
+          <a:xfrm flipV="1">
+            <a:off x="6298275" y="3375411"/>
+            <a:ext cx="107175" cy="107175"/>
+          </a:xfrm>
+          <a:prstGeom prst="ellipse">
+            <a:avLst/>
+          </a:prstGeom>
+          <a:solidFill>
+            <a:srgbClr val="FF0000"/>
+          </a:solidFill>
+          <a:ln w="12700">
+            <a:noFill/>
+            <a:prstDash val="solid"/>
+            <a:extLst>
+              <a:ext uri="{C807C97D-BFC1-408E-A445-0C87EB9F89A2}">
+                <ask:lineSketchStyleProps xmlns:ask="http://schemas.microsoft.com/office/drawing/2018/sketchyshapes">
+                  <ask:type>
+                    <ask:lineSketchNone/>
+                  </ask:type>
+                </ask:lineSketchStyleProps>
+              </a:ext>
+            </a:extLst>
+          </a:ln>
+        </p:spPr>
+        <p:style>
+          <a:lnRef idx="2">
+            <a:schemeClr val="accent1">
+              <a:shade val="50000"/>
+            </a:schemeClr>
+          </a:lnRef>
+          <a:fillRef idx="1">
+            <a:schemeClr val="accent1"/>
+          </a:fillRef>
+          <a:effectRef idx="0">
+            <a:schemeClr val="accent1"/>
+          </a:effectRef>
+          <a:fontRef idx="minor">
+            <a:schemeClr val="lt1"/>
+          </a:fontRef>
+        </p:style>
+        <p:txBody>
+          <a:bodyPr rtlCol="0" anchor="ctr"/>
+          <a:lstStyle/>
+          <a:p>
+            <a:pPr algn="ctr"/>
+            <a:endParaRPr kumimoji="1" lang="ja-JP" altLang="en-US"/>
+          </a:p>
+        </p:txBody>
+      </p:sp>
+      <p:sp>
+        <p:nvSpPr>
+          <p:cNvPr id="2" name="円/楕円 1">
+            <a:extLst>
+              <a:ext uri="{FF2B5EF4-FFF2-40B4-BE49-F238E27FC236}">
+                <a16:creationId xmlns:a16="http://schemas.microsoft.com/office/drawing/2014/main" id="{76753AA0-A52E-7046-ADFB-D3B50287907E}"/>
+              </a:ext>
+            </a:extLst>
+          </p:cNvPr>
+          <p:cNvSpPr/>
+          <p:nvPr/>
+        </p:nvSpPr>
+        <p:spPr>
+          <a:xfrm>
+            <a:off x="4168897" y="2337516"/>
+            <a:ext cx="2182967" cy="2182967"/>
+          </a:xfrm>
+          <a:prstGeom prst="ellipse">
+            <a:avLst/>
+          </a:prstGeom>
+          <a:noFill/>
+          <a:ln w="12700">
+            <a:solidFill>
+              <a:srgbClr val="FF0000"/>
+            </a:solidFill>
+            <a:prstDash val="solid"/>
+            <a:extLst>
+              <a:ext uri="{C807C97D-BFC1-408E-A445-0C87EB9F89A2}">
+                <ask:lineSketchStyleProps xmlns:ask="http://schemas.microsoft.com/office/drawing/2018/sketchyshapes">
+                  <ask:type>
+                    <ask:lineSketchNone/>
+                  </ask:type>
+                </ask:lineSketchStyleProps>
+              </a:ext>
+            </a:extLst>
+          </a:ln>
+        </p:spPr>
+        <p:style>
+          <a:lnRef idx="2">
+            <a:schemeClr val="accent1">
+              <a:shade val="50000"/>
+            </a:schemeClr>
+          </a:lnRef>
+          <a:fillRef idx="1">
+            <a:schemeClr val="accent1"/>
+          </a:fillRef>
+          <a:effectRef idx="0">
+            <a:schemeClr val="accent1"/>
+          </a:effectRef>
+          <a:fontRef idx="minor">
+            <a:schemeClr val="lt1"/>
+          </a:fontRef>
+        </p:style>
+        <p:txBody>
+          <a:bodyPr rtlCol="0" anchor="ctr"/>
+          <a:lstStyle/>
+          <a:p>
+            <a:pPr algn="ctr"/>
+            <a:endParaRPr kumimoji="1" lang="ja-JP" altLang="en-US"/>
+          </a:p>
+        </p:txBody>
+      </p:sp>
+      <p:sp>
+        <p:nvSpPr>
+          <p:cNvPr id="3" name="円/楕円 2">
+            <a:extLst>
+              <a:ext uri="{FF2B5EF4-FFF2-40B4-BE49-F238E27FC236}">
+                <a16:creationId xmlns:a16="http://schemas.microsoft.com/office/drawing/2014/main" id="{58A67331-1B3A-5A4E-86A4-FAC9CAAE6267}"/>
+              </a:ext>
+            </a:extLst>
+          </p:cNvPr>
+          <p:cNvSpPr/>
+          <p:nvPr/>
+        </p:nvSpPr>
+        <p:spPr>
+          <a:xfrm>
+            <a:off x="5260380" y="2337516"/>
+            <a:ext cx="2182967" cy="2182967"/>
+          </a:xfrm>
+          <a:prstGeom prst="ellipse">
+            <a:avLst/>
+          </a:prstGeom>
+          <a:noFill/>
+          <a:ln w="12700">
+            <a:solidFill>
+              <a:srgbClr val="FF0000"/>
+            </a:solidFill>
+            <a:prstDash val="solid"/>
+            <a:extLst>
+              <a:ext uri="{C807C97D-BFC1-408E-A445-0C87EB9F89A2}">
+                <ask:lineSketchStyleProps xmlns:ask="http://schemas.microsoft.com/office/drawing/2018/sketchyshapes">
+                  <ask:type>
+                    <ask:lineSketchNone/>
+                  </ask:type>
+                </ask:lineSketchStyleProps>
+              </a:ext>
+            </a:extLst>
+          </a:ln>
+        </p:spPr>
+        <p:style>
+          <a:lnRef idx="2">
+            <a:schemeClr val="accent1">
+              <a:shade val="50000"/>
+            </a:schemeClr>
+          </a:lnRef>
+          <a:fillRef idx="1">
+            <a:schemeClr val="accent1"/>
+          </a:fillRef>
+          <a:effectRef idx="0">
+            <a:schemeClr val="accent1"/>
+          </a:effectRef>
+          <a:fontRef idx="minor">
+            <a:schemeClr val="lt1"/>
+          </a:fontRef>
+        </p:style>
+        <p:txBody>
+          <a:bodyPr rtlCol="0" anchor="ctr"/>
+          <a:lstStyle/>
+          <a:p>
+            <a:pPr algn="ctr"/>
+            <a:endParaRPr kumimoji="1" lang="ja-JP" altLang="en-US"/>
+          </a:p>
+        </p:txBody>
+      </p:sp>
+      <p:cxnSp>
+        <p:nvCxnSpPr>
+          <p:cNvPr id="5" name="直線矢印コネクタ 4">
+            <a:extLst>
+              <a:ext uri="{FF2B5EF4-FFF2-40B4-BE49-F238E27FC236}">
+                <a16:creationId xmlns:a16="http://schemas.microsoft.com/office/drawing/2014/main" id="{80DBD4AB-3FF9-6444-90F7-2865351E456C}"/>
+              </a:ext>
+            </a:extLst>
+          </p:cNvPr>
+          <p:cNvCxnSpPr>
+            <a:stCxn id="2" idx="2"/>
+            <a:endCxn id="2" idx="6"/>
+          </p:cNvCxnSpPr>
+          <p:nvPr/>
+        </p:nvCxnSpPr>
+        <p:spPr>
+          <a:xfrm>
+            <a:off x="4168897" y="3429000"/>
+            <a:ext cx="2182967" cy="0"/>
+          </a:xfrm>
+          <a:prstGeom prst="straightConnector1">
+            <a:avLst/>
+          </a:prstGeom>
+          <a:ln w="25400">
+            <a:solidFill>
+              <a:schemeClr val="tx1"/>
+            </a:solidFill>
+            <a:headEnd type="triangle" w="lg" len="lg"/>
+            <a:tailEnd type="triangle" w="lg" len="lg"/>
+          </a:ln>
+        </p:spPr>
+        <p:style>
+          <a:lnRef idx="1">
+            <a:schemeClr val="accent1"/>
+          </a:lnRef>
+          <a:fillRef idx="0">
+            <a:schemeClr val="accent1"/>
+          </a:fillRef>
+          <a:effectRef idx="0">
+            <a:schemeClr val="accent1"/>
+          </a:effectRef>
+          <a:fontRef idx="minor">
+            <a:schemeClr val="tx1"/>
+          </a:fontRef>
+        </p:style>
+      </p:cxnSp>
+      <p:sp>
+        <p:nvSpPr>
+          <p:cNvPr id="6" name="テキスト ボックス 5">
+            <a:extLst>
+              <a:ext uri="{FF2B5EF4-FFF2-40B4-BE49-F238E27FC236}">
+                <a16:creationId xmlns:a16="http://schemas.microsoft.com/office/drawing/2014/main" id="{BE3CB49E-2D25-5342-86B3-18AE52570782}"/>
+              </a:ext>
+            </a:extLst>
+          </p:cNvPr>
+          <p:cNvSpPr txBox="1"/>
+          <p:nvPr/>
+        </p:nvSpPr>
+        <p:spPr>
+          <a:xfrm>
+            <a:off x="4496500" y="3435290"/>
+            <a:ext cx="679994" cy="369332"/>
+          </a:xfrm>
+          <a:prstGeom prst="rect">
+            <a:avLst/>
+          </a:prstGeom>
+          <a:noFill/>
+        </p:spPr>
+        <p:txBody>
+          <a:bodyPr wrap="none" rtlCol="0">
+            <a:spAutoFit/>
+          </a:bodyPr>
+          <a:lstStyle/>
+          <a:p>
+            <a:pPr algn="ctr"/>
+            <a:r>
+              <a:rPr kumimoji="1" lang="en-US" altLang="ja-JP" dirty="0">
+                <a:latin typeface="Arial" panose="020B0604020202020204" pitchFamily="34" charset="0"/>
+                <a:cs typeface="Arial" panose="020B0604020202020204" pitchFamily="34" charset="0"/>
+              </a:rPr>
+              <a:t>HPD</a:t>
+            </a:r>
+            <a:endParaRPr kumimoji="1" lang="ja-JP" altLang="en-US">
+              <a:latin typeface="Arial" panose="020B0604020202020204" pitchFamily="34" charset="0"/>
+              <a:cs typeface="Arial" panose="020B0604020202020204" pitchFamily="34" charset="0"/>
+            </a:endParaRPr>
+          </a:p>
+        </p:txBody>
+      </p:sp>
+      <p:sp>
+        <p:nvSpPr>
+          <p:cNvPr id="8" name="円/楕円 7">
+            <a:extLst>
+              <a:ext uri="{FF2B5EF4-FFF2-40B4-BE49-F238E27FC236}">
+                <a16:creationId xmlns:a16="http://schemas.microsoft.com/office/drawing/2014/main" id="{D8540F65-4D1B-EF4A-BB4C-039F2D8732EA}"/>
+              </a:ext>
+            </a:extLst>
+          </p:cNvPr>
+          <p:cNvSpPr/>
+          <p:nvPr/>
+        </p:nvSpPr>
+        <p:spPr>
+          <a:xfrm flipV="1">
+            <a:off x="5206790" y="3375411"/>
+            <a:ext cx="107175" cy="107175"/>
+          </a:xfrm>
+          <a:prstGeom prst="ellipse">
+            <a:avLst/>
+          </a:prstGeom>
+          <a:solidFill>
+            <a:srgbClr val="FF0000"/>
+          </a:solidFill>
+          <a:ln w="12700">
+            <a:noFill/>
+            <a:prstDash val="solid"/>
+            <a:extLst>
+              <a:ext uri="{C807C97D-BFC1-408E-A445-0C87EB9F89A2}">
+                <ask:lineSketchStyleProps xmlns:ask="http://schemas.microsoft.com/office/drawing/2018/sketchyshapes">
+                  <ask:type>
+                    <ask:lineSketchNone/>
+                  </ask:type>
+                </ask:lineSketchStyleProps>
+              </a:ext>
+            </a:extLst>
+          </a:ln>
+        </p:spPr>
+        <p:style>
+          <a:lnRef idx="2">
+            <a:schemeClr val="accent1">
+              <a:shade val="50000"/>
+            </a:schemeClr>
+          </a:lnRef>
+          <a:fillRef idx="1">
+            <a:schemeClr val="accent1"/>
+          </a:fillRef>
+          <a:effectRef idx="0">
+            <a:schemeClr val="accent1"/>
+          </a:effectRef>
+          <a:fontRef idx="minor">
+            <a:schemeClr val="lt1"/>
+          </a:fontRef>
+        </p:style>
+        <p:txBody>
+          <a:bodyPr rtlCol="0" anchor="ctr"/>
+          <a:lstStyle/>
+          <a:p>
+            <a:pPr algn="ctr"/>
+            <a:endParaRPr kumimoji="1" lang="ja-JP" altLang="en-US"/>
+          </a:p>
+        </p:txBody>
+      </p:sp>
+    </p:spTree>
+    <p:extLst>
+      <p:ext uri="{BB962C8B-B14F-4D97-AF65-F5344CB8AC3E}">
+        <p14:creationId xmlns:p14="http://schemas.microsoft.com/office/powerpoint/2010/main" val="1465936288"/>
+      </p:ext>
+    </p:extLst>
+  </p:cSld>
+  <p:clrMapOvr>
+    <a:masterClrMapping/>
+  </p:clrMapOvr>
+</p:sld>
+</file>
+
+<file path=ppt/slides/slide15.xml><?xml version="1.0" encoding="utf-8"?>
+<p:sld xmlns:a="http://schemas.openxmlformats.org/drawingml/2006/main" xmlns:r="http://schemas.openxmlformats.org/officeDocument/2006/relationships" xmlns:p="http://schemas.openxmlformats.org/presentationml/2006/main">
+  <p:cSld>
+    <p:spTree>
+      <p:nvGrpSpPr>
+        <p:cNvPr id="1" name=""/>
+        <p:cNvGrpSpPr/>
+        <p:nvPr/>
+      </p:nvGrpSpPr>
+      <p:grpSpPr>
+        <a:xfrm>
+          <a:off x="0" y="0"/>
+          <a:ext cx="0" cy="0"/>
+          <a:chOff x="0" y="0"/>
+          <a:chExt cx="0" cy="0"/>
+        </a:xfrm>
+      </p:grpSpPr>
+      <p:pic>
+        <p:nvPicPr>
+          <p:cNvPr id="2" name="図 1" descr="スポーツゲーム, ミラー, テーブル が含まれている画像&#10;&#10;自動的に生成された説明">
+            <a:extLst>
+              <a:ext uri="{FF2B5EF4-FFF2-40B4-BE49-F238E27FC236}">
+                <a16:creationId xmlns:a16="http://schemas.microsoft.com/office/drawing/2014/main" id="{361956CF-B24A-ED4C-81C0-8ED7BB76BC46}"/>
+              </a:ext>
+            </a:extLst>
+          </p:cNvPr>
+          <p:cNvPicPr>
+            <a:picLocks noChangeAspect="1"/>
+          </p:cNvPicPr>
+          <p:nvPr/>
+        </p:nvPicPr>
+        <p:blipFill>
+          <a:blip r:embed="rId2"/>
+          <a:stretch>
+            <a:fillRect/>
+          </a:stretch>
+        </p:blipFill>
+        <p:spPr>
+          <a:xfrm>
+            <a:off x="2376224" y="2209657"/>
+            <a:ext cx="3975559" cy="2007374"/>
+          </a:xfrm>
+          <a:prstGeom prst="rect">
+            <a:avLst/>
+          </a:prstGeom>
+        </p:spPr>
+      </p:pic>
+      <p:sp>
+        <p:nvSpPr>
+          <p:cNvPr id="3" name="正方形/長方形 2">
+            <a:extLst>
+              <a:ext uri="{FF2B5EF4-FFF2-40B4-BE49-F238E27FC236}">
+                <a16:creationId xmlns:a16="http://schemas.microsoft.com/office/drawing/2014/main" id="{E1C5B159-5AEB-C04E-A2DE-0C4C240D881E}"/>
+              </a:ext>
+            </a:extLst>
+          </p:cNvPr>
+          <p:cNvSpPr/>
+          <p:nvPr/>
+        </p:nvSpPr>
+        <p:spPr>
+          <a:xfrm>
+            <a:off x="6835407" y="2963008"/>
+            <a:ext cx="1621839" cy="1617230"/>
+          </a:xfrm>
+          <a:prstGeom prst="rect">
+            <a:avLst/>
+          </a:prstGeom>
+          <a:noFill/>
+          <a:ln w="19050">
+            <a:solidFill>
+              <a:schemeClr val="tx1"/>
+            </a:solidFill>
+          </a:ln>
+          <a:scene3d>
+            <a:camera prst="orthographicFront">
+              <a:rot lat="600000" lon="19199986" rev="0"/>
+            </a:camera>
+            <a:lightRig rig="threePt" dir="t"/>
+          </a:scene3d>
+        </p:spPr>
+        <p:style>
+          <a:lnRef idx="2">
+            <a:schemeClr val="accent1">
+              <a:shade val="50000"/>
+            </a:schemeClr>
+          </a:lnRef>
+          <a:fillRef idx="1">
+            <a:schemeClr val="accent1"/>
+          </a:fillRef>
+          <a:effectRef idx="0">
+            <a:schemeClr val="accent1"/>
+          </a:effectRef>
+          <a:fontRef idx="minor">
+            <a:schemeClr val="lt1"/>
+          </a:fontRef>
+        </p:style>
+        <p:txBody>
+          <a:bodyPr rtlCol="0" anchor="ctr"/>
+          <a:lstStyle/>
+          <a:p>
+            <a:pPr algn="ctr"/>
+            <a:endParaRPr kumimoji="1" lang="ja-JP" altLang="en-US"/>
+          </a:p>
+        </p:txBody>
+      </p:sp>
+      <p:cxnSp>
+        <p:nvCxnSpPr>
+          <p:cNvPr id="5" name="直線コネクタ 4">
+            <a:extLst>
+              <a:ext uri="{FF2B5EF4-FFF2-40B4-BE49-F238E27FC236}">
+                <a16:creationId xmlns:a16="http://schemas.microsoft.com/office/drawing/2014/main" id="{B0B78339-06BB-D147-9554-22AAB52C54D5}"/>
+              </a:ext>
+            </a:extLst>
+          </p:cNvPr>
+          <p:cNvCxnSpPr>
+            <a:cxnSpLocks/>
+            <a:endCxn id="6" idx="0"/>
+          </p:cNvCxnSpPr>
+          <p:nvPr/>
+        </p:nvCxnSpPr>
+        <p:spPr>
+          <a:xfrm>
+            <a:off x="3015762" y="2963008"/>
+            <a:ext cx="4686616" cy="637134"/>
+          </a:xfrm>
+          <a:prstGeom prst="line">
+            <a:avLst/>
+          </a:prstGeom>
+          <a:ln w="12700">
+            <a:solidFill>
+              <a:srgbClr val="FF0000"/>
+            </a:solidFill>
+          </a:ln>
+        </p:spPr>
+        <p:style>
+          <a:lnRef idx="1">
+            <a:schemeClr val="accent1"/>
+          </a:lnRef>
+          <a:fillRef idx="0">
+            <a:schemeClr val="accent1"/>
+          </a:fillRef>
+          <a:effectRef idx="0">
+            <a:schemeClr val="accent1"/>
+          </a:effectRef>
+          <a:fontRef idx="minor">
+            <a:schemeClr val="tx1"/>
+          </a:fontRef>
+        </p:style>
+      </p:cxnSp>
+      <p:sp>
+        <p:nvSpPr>
+          <p:cNvPr id="6" name="円/楕円 5">
+            <a:extLst>
+              <a:ext uri="{FF2B5EF4-FFF2-40B4-BE49-F238E27FC236}">
+                <a16:creationId xmlns:a16="http://schemas.microsoft.com/office/drawing/2014/main" id="{4D071914-1077-4C4E-B5CB-53F25C256A34}"/>
+              </a:ext>
+            </a:extLst>
+          </p:cNvPr>
+          <p:cNvSpPr/>
+          <p:nvPr/>
+        </p:nvSpPr>
+        <p:spPr>
+          <a:xfrm>
+            <a:off x="7494842" y="3600142"/>
+            <a:ext cx="415072" cy="427953"/>
+          </a:xfrm>
+          <a:prstGeom prst="ellipse">
+            <a:avLst/>
+          </a:prstGeom>
+          <a:noFill/>
+          <a:ln w="15875">
+            <a:solidFill>
+              <a:srgbClr val="FF0000"/>
+            </a:solidFill>
+          </a:ln>
+          <a:scene3d>
+            <a:camera prst="orthographicFront">
+              <a:rot lat="0" lon="19199985" rev="0"/>
+            </a:camera>
+            <a:lightRig rig="threePt" dir="t"/>
+          </a:scene3d>
+        </p:spPr>
+        <p:style>
+          <a:lnRef idx="2">
+            <a:schemeClr val="accent1">
+              <a:shade val="50000"/>
+            </a:schemeClr>
+          </a:lnRef>
+          <a:fillRef idx="1">
+            <a:schemeClr val="accent1"/>
+          </a:fillRef>
+          <a:effectRef idx="0">
+            <a:schemeClr val="accent1"/>
+          </a:effectRef>
+          <a:fontRef idx="minor">
+            <a:schemeClr val="lt1"/>
+          </a:fontRef>
+        </p:style>
+        <p:txBody>
+          <a:bodyPr rtlCol="0" anchor="ctr"/>
+          <a:lstStyle/>
+          <a:p>
+            <a:pPr algn="ctr"/>
+            <a:endParaRPr kumimoji="1" lang="ja-JP" altLang="en-US"/>
+          </a:p>
+        </p:txBody>
+      </p:sp>
+      <p:cxnSp>
+        <p:nvCxnSpPr>
+          <p:cNvPr id="8" name="直線コネクタ 7">
+            <a:extLst>
+              <a:ext uri="{FF2B5EF4-FFF2-40B4-BE49-F238E27FC236}">
+                <a16:creationId xmlns:a16="http://schemas.microsoft.com/office/drawing/2014/main" id="{9BC315C8-1B5A-214C-A494-BC58A2DD2885}"/>
+              </a:ext>
+            </a:extLst>
+          </p:cNvPr>
+          <p:cNvCxnSpPr>
+            <a:cxnSpLocks/>
+          </p:cNvCxnSpPr>
+          <p:nvPr/>
+        </p:nvCxnSpPr>
+        <p:spPr>
+          <a:xfrm>
+            <a:off x="3015762" y="2963008"/>
+            <a:ext cx="4686616" cy="851111"/>
+          </a:xfrm>
+          <a:prstGeom prst="line">
+            <a:avLst/>
+          </a:prstGeom>
+          <a:ln w="12700">
+            <a:solidFill>
+              <a:srgbClr val="FF0000"/>
+            </a:solidFill>
+          </a:ln>
+        </p:spPr>
+        <p:style>
+          <a:lnRef idx="1">
+            <a:schemeClr val="accent1"/>
+          </a:lnRef>
+          <a:fillRef idx="0">
+            <a:schemeClr val="accent1"/>
+          </a:fillRef>
+          <a:effectRef idx="0">
+            <a:schemeClr val="accent1"/>
+          </a:effectRef>
+          <a:fontRef idx="minor">
+            <a:schemeClr val="tx1"/>
+          </a:fontRef>
+        </p:style>
+      </p:cxnSp>
+      <p:sp>
+        <p:nvSpPr>
+          <p:cNvPr id="12" name="アーチ 11">
+            <a:extLst>
+              <a:ext uri="{FF2B5EF4-FFF2-40B4-BE49-F238E27FC236}">
+                <a16:creationId xmlns:a16="http://schemas.microsoft.com/office/drawing/2014/main" id="{2CF5C553-686A-BE48-B7E2-A75A9BB704B1}"/>
+              </a:ext>
+            </a:extLst>
+          </p:cNvPr>
+          <p:cNvSpPr/>
+          <p:nvPr/>
+        </p:nvSpPr>
+        <p:spPr>
+          <a:xfrm rot="980056">
+            <a:off x="6156751" y="3261237"/>
+            <a:ext cx="417906" cy="538760"/>
+          </a:xfrm>
+          <a:prstGeom prst="blockArc">
+            <a:avLst>
+              <a:gd name="adj1" fmla="val 19526620"/>
+              <a:gd name="adj2" fmla="val 21480308"/>
+              <a:gd name="adj3" fmla="val 0"/>
+            </a:avLst>
+          </a:prstGeom>
+          <a:solidFill>
+            <a:schemeClr val="tx1"/>
+          </a:solidFill>
+          <a:ln w="12700">
+            <a:solidFill>
+              <a:schemeClr val="tx1"/>
+            </a:solidFill>
+          </a:ln>
+        </p:spPr>
+        <p:style>
+          <a:lnRef idx="2">
+            <a:schemeClr val="accent1">
+              <a:shade val="50000"/>
+            </a:schemeClr>
+          </a:lnRef>
+          <a:fillRef idx="1">
+            <a:schemeClr val="accent1"/>
+          </a:fillRef>
+          <a:effectRef idx="0">
+            <a:schemeClr val="accent1"/>
+          </a:effectRef>
+          <a:fontRef idx="minor">
+            <a:schemeClr val="lt1"/>
+          </a:fontRef>
+        </p:style>
+        <p:txBody>
+          <a:bodyPr rtlCol="0" anchor="ctr"/>
+          <a:lstStyle/>
+          <a:p>
+            <a:pPr algn="ctr"/>
+            <a:endParaRPr kumimoji="1" lang="ja-JP" altLang="en-US">
+              <a:solidFill>
+                <a:schemeClr val="tx1"/>
+              </a:solidFill>
+            </a:endParaRPr>
+          </a:p>
+        </p:txBody>
+      </p:sp>
+      <p:sp>
+        <p:nvSpPr>
+          <p:cNvPr id="13" name="テキスト ボックス 12">
+            <a:extLst>
+              <a:ext uri="{FF2B5EF4-FFF2-40B4-BE49-F238E27FC236}">
+                <a16:creationId xmlns:a16="http://schemas.microsoft.com/office/drawing/2014/main" id="{0D744D6B-1E28-7742-AD5F-63ED22FDD268}"/>
+              </a:ext>
+            </a:extLst>
+          </p:cNvPr>
+          <p:cNvSpPr txBox="1"/>
+          <p:nvPr/>
+        </p:nvSpPr>
+        <p:spPr>
+          <a:xfrm>
+            <a:off x="6419950" y="3059668"/>
+            <a:ext cx="394660" cy="369332"/>
+          </a:xfrm>
+          <a:prstGeom prst="rect">
+            <a:avLst/>
+          </a:prstGeom>
+          <a:noFill/>
+        </p:spPr>
+        <p:txBody>
+          <a:bodyPr wrap="square" rtlCol="0">
+            <a:spAutoFit/>
+          </a:bodyPr>
+          <a:lstStyle/>
+          <a:p>
+            <a:pPr algn="ctr"/>
+            <a:r>
+              <a:rPr kumimoji="1" lang="en-US" altLang="ja-JP" dirty="0">
+                <a:latin typeface="Arial" panose="020B0604020202020204" pitchFamily="34" charset="0"/>
+                <a:cs typeface="Arial" panose="020B0604020202020204" pitchFamily="34" charset="0"/>
+              </a:rPr>
+              <a:t>1</a:t>
+            </a:r>
+            <a:r>
+              <a:rPr lang="en-US" altLang="ja-JP" dirty="0">
+                <a:latin typeface="Arial" panose="020B0604020202020204" pitchFamily="34" charset="0"/>
+                <a:cs typeface="Arial" panose="020B0604020202020204" pitchFamily="34" charset="0"/>
+              </a:rPr>
+              <a:t>″</a:t>
+            </a:r>
+            <a:endParaRPr kumimoji="1" lang="ja-JP" altLang="en-US">
+              <a:latin typeface="Arial" panose="020B0604020202020204" pitchFamily="34" charset="0"/>
+              <a:cs typeface="Arial" panose="020B0604020202020204" pitchFamily="34" charset="0"/>
+            </a:endParaRPr>
+          </a:p>
+        </p:txBody>
+      </p:sp>
+      <p:cxnSp>
+        <p:nvCxnSpPr>
+          <p:cNvPr id="16" name="直線矢印コネクタ 15">
+            <a:extLst>
+              <a:ext uri="{FF2B5EF4-FFF2-40B4-BE49-F238E27FC236}">
+                <a16:creationId xmlns:a16="http://schemas.microsoft.com/office/drawing/2014/main" id="{160F48A2-FA60-684A-9CAA-91187DD7CB75}"/>
+              </a:ext>
+            </a:extLst>
+          </p:cNvPr>
+          <p:cNvCxnSpPr>
+            <a:cxnSpLocks/>
+            <a:stCxn id="6" idx="0"/>
+            <a:endCxn id="6" idx="4"/>
+          </p:cNvCxnSpPr>
+          <p:nvPr/>
+        </p:nvCxnSpPr>
+        <p:spPr>
+          <a:xfrm>
+            <a:off x="7702378" y="3600142"/>
+            <a:ext cx="0" cy="427953"/>
+          </a:xfrm>
+          <a:prstGeom prst="straightConnector1">
+            <a:avLst/>
+          </a:prstGeom>
+          <a:ln>
+            <a:solidFill>
+              <a:schemeClr val="tx1"/>
+            </a:solidFill>
+            <a:headEnd type="triangle"/>
+            <a:tailEnd type="triangle"/>
+          </a:ln>
+        </p:spPr>
+        <p:style>
+          <a:lnRef idx="1">
+            <a:schemeClr val="accent1"/>
+          </a:lnRef>
+          <a:fillRef idx="0">
+            <a:schemeClr val="accent1"/>
+          </a:fillRef>
+          <a:effectRef idx="0">
+            <a:schemeClr val="accent1"/>
+          </a:effectRef>
+          <a:fontRef idx="minor">
+            <a:schemeClr val="tx1"/>
+          </a:fontRef>
+        </p:style>
+      </p:cxnSp>
+      <p:sp>
+        <p:nvSpPr>
+          <p:cNvPr id="35" name="テキスト ボックス 34">
+            <a:extLst>
+              <a:ext uri="{FF2B5EF4-FFF2-40B4-BE49-F238E27FC236}">
+                <a16:creationId xmlns:a16="http://schemas.microsoft.com/office/drawing/2014/main" id="{3B20D8A2-BC2F-0240-B387-0A7449983BE7}"/>
+              </a:ext>
+            </a:extLst>
+          </p:cNvPr>
+          <p:cNvSpPr txBox="1"/>
+          <p:nvPr/>
+        </p:nvSpPr>
+        <p:spPr>
+          <a:xfrm>
+            <a:off x="7627625" y="3281575"/>
+            <a:ext cx="564577" cy="307777"/>
+          </a:xfrm>
+          <a:prstGeom prst="rect">
+            <a:avLst/>
+          </a:prstGeom>
+          <a:noFill/>
+        </p:spPr>
+        <p:txBody>
+          <a:bodyPr wrap="none" rtlCol="0">
+            <a:spAutoFit/>
+          </a:bodyPr>
+          <a:lstStyle/>
+          <a:p>
+            <a:pPr algn="ctr"/>
+            <a:r>
+              <a:rPr kumimoji="1" lang="en-US" altLang="ja-JP" sz="1400" dirty="0">
+                <a:latin typeface="Arial" panose="020B0604020202020204" pitchFamily="34" charset="0"/>
+                <a:cs typeface="Arial" panose="020B0604020202020204" pitchFamily="34" charset="0"/>
+              </a:rPr>
+              <a:t>HPD</a:t>
+            </a:r>
+            <a:endParaRPr kumimoji="1" lang="ja-JP" altLang="en-US" sz="1400">
+              <a:latin typeface="Arial" panose="020B0604020202020204" pitchFamily="34" charset="0"/>
+              <a:cs typeface="Arial" panose="020B0604020202020204" pitchFamily="34" charset="0"/>
+            </a:endParaRPr>
+          </a:p>
+        </p:txBody>
+      </p:sp>
+    </p:spTree>
+    <p:extLst>
+      <p:ext uri="{BB962C8B-B14F-4D97-AF65-F5344CB8AC3E}">
+        <p14:creationId xmlns:p14="http://schemas.microsoft.com/office/powerpoint/2010/main" val="2175050719"/>
       </p:ext>
     </p:extLst>
   </p:cSld>
@@ -26829,7 +27663,7 @@
         </p:blipFill>
         <p:spPr>
           <a:xfrm>
-            <a:off x="2015740" y="2174488"/>
+            <a:off x="2024532" y="2174488"/>
             <a:ext cx="3975559" cy="2007374"/>
           </a:xfrm>
           <a:prstGeom prst="rect">

</xml_diff>